<commit_message>
- kit.pptx: '$' --> '.'
</commit_message>
<xml_diff>
--- a/DsDotNet/src/UnitTest/UnitTest.Model/ImportOfficeExample/demo/ppt/kit.pptx
+++ b/DsDotNet/src/UnitTest/UnitTest.Model/ImportOfficeExample/demo/ppt/kit.pptx
@@ -222,7 +222,7 @@
           <a:p>
             <a:fld id="{DD503887-5801-43A0-AEF9-041E8DDC2558}" type="datetimeFigureOut">
               <a:rPr lang="ko-KR" altLang="en-US" smtClean="0"/>
-              <a:t>2023-10-19</a:t>
+              <a:t>2023-11-11</a:t>
             </a:fld>
             <a:endParaRPr lang="ko-KR" altLang="en-US" dirty="0"/>
           </a:p>
@@ -399,7 +399,7 @@
           <a:p>
             <a:fld id="{95336A0E-57B1-4D4C-BD9B-2F72B5943464}" type="datetimeFigureOut">
               <a:rPr lang="ko-KR" altLang="en-US" smtClean="0"/>
-              <a:t>2023-10-19</a:t>
+              <a:t>2023-11-11</a:t>
             </a:fld>
             <a:endParaRPr lang="ko-KR" altLang="en-US" dirty="0"/>
           </a:p>
@@ -1317,7 +1317,7 @@
           <a:p>
             <a:fld id="{229D12C7-0FF5-4972-A033-474EFFC79F40}" type="datetime1">
               <a:rPr lang="ko-KR" altLang="en-US" smtClean="0"/>
-              <a:t>2023-10-19</a:t>
+              <a:t>2023-11-11</a:t>
             </a:fld>
             <a:endParaRPr lang="ko-KR" altLang="en-US" dirty="0"/>
           </a:p>
@@ -1515,7 +1515,7 @@
           <a:p>
             <a:fld id="{5BA19FD4-B052-4F56-8FD8-EAFD078DEFB0}" type="datetime1">
               <a:rPr lang="ko-KR" altLang="en-US" smtClean="0"/>
-              <a:t>2023-10-19</a:t>
+              <a:t>2023-11-11</a:t>
             </a:fld>
             <a:endParaRPr lang="ko-KR" altLang="en-US" dirty="0"/>
           </a:p>
@@ -1723,7 +1723,7 @@
           <a:p>
             <a:fld id="{024994B9-23A6-4B0A-A038-AC140E83DAA3}" type="datetime1">
               <a:rPr lang="ko-KR" altLang="en-US" smtClean="0"/>
-              <a:t>2023-10-19</a:t>
+              <a:t>2023-11-11</a:t>
             </a:fld>
             <a:endParaRPr lang="ko-KR" altLang="en-US" dirty="0"/>
           </a:p>
@@ -1865,7 +1865,7 @@
           <a:p>
             <a:fld id="{B5B1BBC2-B738-4C35-AEE5-660EB2DEB482}" type="datetime1">
               <a:rPr lang="ko-KR" altLang="en-US" smtClean="0"/>
-              <a:t>2023-10-19</a:t>
+              <a:t>2023-11-11</a:t>
             </a:fld>
             <a:endParaRPr lang="ko-KR" altLang="en-US" dirty="0"/>
           </a:p>
@@ -6532,7 +6532,7 @@
           <a:p>
             <a:fld id="{70D0DAB2-87CB-4028-B965-3AA710ADF2CB}" type="datetime1">
               <a:rPr lang="ko-KR" altLang="en-US" smtClean="0"/>
-              <a:t>2023-10-19</a:t>
+              <a:t>2023-11-11</a:t>
             </a:fld>
             <a:endParaRPr lang="ko-KR" altLang="en-US" dirty="0"/>
           </a:p>
@@ -6807,7 +6807,7 @@
           <a:p>
             <a:fld id="{63FA3D71-FEA8-477F-9D1E-EA860F411BC7}" type="datetime1">
               <a:rPr lang="ko-KR" altLang="en-US" smtClean="0"/>
-              <a:t>2023-10-19</a:t>
+              <a:t>2023-11-11</a:t>
             </a:fld>
             <a:endParaRPr lang="ko-KR" altLang="en-US" dirty="0"/>
           </a:p>
@@ -7072,7 +7072,7 @@
           <a:p>
             <a:fld id="{F58E3EF4-7980-4C97-BA64-EC66995BB574}" type="datetime1">
               <a:rPr lang="ko-KR" altLang="en-US" smtClean="0"/>
-              <a:t>2023-10-19</a:t>
+              <a:t>2023-11-11</a:t>
             </a:fld>
             <a:endParaRPr lang="ko-KR" altLang="en-US" dirty="0"/>
           </a:p>
@@ -7484,7 +7484,7 @@
           <a:p>
             <a:fld id="{FC9BC1D0-7D6B-4634-9D19-644040D74EAE}" type="datetime1">
               <a:rPr lang="ko-KR" altLang="en-US" smtClean="0"/>
-              <a:t>2023-10-19</a:t>
+              <a:t>2023-11-11</a:t>
             </a:fld>
             <a:endParaRPr lang="ko-KR" altLang="en-US" dirty="0"/>
           </a:p>
@@ -7625,7 +7625,7 @@
           <a:p>
             <a:fld id="{B5B1BBC2-B738-4C35-AEE5-660EB2DEB482}" type="datetime1">
               <a:rPr lang="ko-KR" altLang="en-US" smtClean="0"/>
-              <a:t>2023-10-19</a:t>
+              <a:t>2023-11-11</a:t>
             </a:fld>
             <a:endParaRPr lang="ko-KR" altLang="en-US" dirty="0"/>
           </a:p>
@@ -12207,7 +12207,7 @@
           <a:p>
             <a:fld id="{C60E9F93-7E77-4F36-B88C-A425F00C8D91}" type="datetime1">
               <a:rPr lang="ko-KR" altLang="en-US" smtClean="0"/>
-              <a:t>2023-10-19</a:t>
+              <a:t>2023-11-11</a:t>
             </a:fld>
             <a:endParaRPr lang="ko-KR" altLang="en-US" dirty="0"/>
           </a:p>
@@ -12518,7 +12518,7 @@
           <a:p>
             <a:fld id="{36BCCD0E-2A54-4016-BFFC-FEAABCDA6915}" type="datetime1">
               <a:rPr lang="ko-KR" altLang="en-US" smtClean="0"/>
-              <a:t>2023-10-19</a:t>
+              <a:t>2023-11-11</a:t>
             </a:fld>
             <a:endParaRPr lang="ko-KR" altLang="en-US" dirty="0"/>
           </a:p>
@@ -12806,7 +12806,7 @@
           <a:p>
             <a:fld id="{C984B0C4-64BA-4E4C-B5E6-A51EE3F6ED95}" type="datetime1">
               <a:rPr lang="ko-KR" altLang="en-US" smtClean="0"/>
-              <a:t>2023-10-19</a:t>
+              <a:t>2023-11-11</a:t>
             </a:fld>
             <a:endParaRPr lang="ko-KR" altLang="en-US" dirty="0"/>
           </a:p>
@@ -13048,7 +13048,7 @@
           <a:p>
             <a:fld id="{C984B0C4-64BA-4E4C-B5E6-A51EE3F6ED95}" type="datetime1">
               <a:rPr lang="ko-KR" altLang="en-US" smtClean="0"/>
-              <a:t>2023-10-19</a:t>
+              <a:t>2023-11-11</a:t>
             </a:fld>
             <a:endParaRPr lang="ko-KR" altLang="en-US" dirty="0"/>
           </a:p>
@@ -13669,12 +13669,12 @@
                     <a:p>
                       <a:pPr algn="ctr" rtl="0" fontAlgn="ctr"/>
                       <a:r>
-                        <a:rPr lang="en-US" sz="500" u="none" strike="noStrike">
+                        <a:rPr lang="en-US" sz="500" u="none" strike="noStrike" dirty="0">
                           <a:effectLst/>
                         </a:rPr>
                         <a:t>Case</a:t>
                       </a:r>
-                      <a:endParaRPr lang="en-US" sz="500" b="0" i="0" u="none" strike="noStrike">
+                      <a:endParaRPr lang="en-US" sz="500" b="0" i="0" u="none" strike="noStrike" dirty="0">
                         <a:solidFill>
                           <a:srgbClr val="000000"/>
                         </a:solidFill>
@@ -19530,7 +19530,7 @@
                     <a:schemeClr val="bg1"/>
                   </a:solidFill>
                 </a:rPr>
-                <a:t>$MOVE</a:t>
+                <a:t>.MOVE</a:t>
               </a:r>
               <a:endParaRPr lang="ko-KR" altLang="en-US" sz="800" dirty="0">
                 <a:solidFill>
@@ -19600,7 +19600,7 @@
                     <a:schemeClr val="bg1"/>
                   </a:solidFill>
                 </a:rPr>
-                <a:t>$RET</a:t>
+                <a:t>.RET</a:t>
               </a:r>
               <a:endParaRPr lang="ko-KR" altLang="en-US" sz="800" dirty="0">
                 <a:solidFill>
@@ -19670,7 +19670,7 @@
                     <a:schemeClr val="bg1"/>
                   </a:solidFill>
                 </a:rPr>
-                <a:t>$ADV</a:t>
+                <a:t>.ADV</a:t>
               </a:r>
               <a:endParaRPr lang="ko-KR" altLang="en-US" sz="800" dirty="0">
                 <a:solidFill>
@@ -19827,7 +19827,7 @@
                     <a:schemeClr val="bg1"/>
                   </a:solidFill>
                 </a:rPr>
-                <a:t> $REMOVE</a:t>
+                <a:t> .REMOVE</a:t>
               </a:r>
               <a:endParaRPr lang="ko-KR" altLang="en-US" sz="800" dirty="0">
                 <a:solidFill>
@@ -20821,7 +20821,7 @@
                       <a:schemeClr val="bg1"/>
                     </a:solidFill>
                   </a:rPr>
-                  <a:t>$MOVE</a:t>
+                  <a:t>.MOVE</a:t>
                 </a:r>
                 <a:endParaRPr lang="ko-KR" altLang="en-US" sz="800" dirty="0">
                   <a:solidFill>
@@ -20892,7 +20892,7 @@
                     <a:schemeClr val="bg1"/>
                   </a:solidFill>
                 </a:rPr>
-                <a:t>$ADV</a:t>
+                <a:t>.ADV</a:t>
               </a:r>
               <a:endParaRPr lang="ko-KR" altLang="en-US" sz="800" dirty="0">
                 <a:solidFill>
@@ -20962,7 +20962,7 @@
                     <a:schemeClr val="bg1"/>
                   </a:solidFill>
                 </a:rPr>
-                <a:t>$ADV</a:t>
+                <a:t>.ADV</a:t>
               </a:r>
               <a:endParaRPr lang="ko-KR" altLang="en-US" sz="800" dirty="0">
                 <a:solidFill>
@@ -21032,7 +21032,7 @@
                     <a:schemeClr val="bg1"/>
                   </a:solidFill>
                 </a:rPr>
-                <a:t>$ADV</a:t>
+                <a:t>.ADV</a:t>
               </a:r>
               <a:endParaRPr lang="ko-KR" altLang="en-US" sz="800" dirty="0">
                 <a:solidFill>
@@ -21102,7 +21102,7 @@
                     <a:schemeClr val="bg1"/>
                   </a:solidFill>
                 </a:rPr>
-                <a:t>$ADV</a:t>
+                <a:t>.ADV</a:t>
               </a:r>
               <a:endParaRPr lang="ko-KR" altLang="en-US" sz="800" dirty="0">
                 <a:solidFill>
@@ -21172,7 +21172,7 @@
                     <a:schemeClr val="bg1"/>
                   </a:solidFill>
                 </a:rPr>
-                <a:t>$RET</a:t>
+                <a:t>.RET</a:t>
               </a:r>
               <a:endParaRPr lang="ko-KR" altLang="en-US" sz="800" dirty="0">
                 <a:solidFill>
@@ -21242,7 +21242,7 @@
                     <a:schemeClr val="bg1"/>
                   </a:solidFill>
                 </a:rPr>
-                <a:t>$RET</a:t>
+                <a:t>.RET</a:t>
               </a:r>
               <a:endParaRPr lang="ko-KR" altLang="en-US" sz="800" dirty="0">
                 <a:solidFill>
@@ -21312,7 +21312,7 @@
                     <a:schemeClr val="bg1"/>
                   </a:solidFill>
                 </a:rPr>
-                <a:t>$RET</a:t>
+                <a:t>.RET</a:t>
               </a:r>
               <a:endParaRPr lang="ko-KR" altLang="en-US" sz="800" dirty="0">
                 <a:solidFill>
@@ -21382,7 +21382,7 @@
                     <a:schemeClr val="bg1"/>
                   </a:solidFill>
                 </a:rPr>
-                <a:t>$RET</a:t>
+                <a:t>.RET</a:t>
               </a:r>
               <a:endParaRPr lang="ko-KR" altLang="en-US" sz="800" dirty="0">
                 <a:solidFill>
@@ -21441,7 +21441,7 @@
                     <a:schemeClr val="bg1"/>
                   </a:solidFill>
                 </a:rPr>
-                <a:t>stp$RET</a:t>
+                <a:t>stp.RET</a:t>
               </a:r>
               <a:endParaRPr lang="ko-KR" altLang="en-US" sz="800" dirty="0">
                 <a:solidFill>
@@ -21516,7 +21516,7 @@
                     <a:schemeClr val="bg1"/>
                   </a:solidFill>
                 </a:rPr>
-                <a:t>$ADV</a:t>
+                <a:t>.ADV</a:t>
               </a:r>
               <a:endParaRPr lang="ko-KR" altLang="en-US" sz="800" dirty="0">
                 <a:solidFill>
@@ -21586,7 +21586,7 @@
                     <a:schemeClr val="bg1"/>
                   </a:solidFill>
                 </a:rPr>
-                <a:t>$REMOVE</a:t>
+                <a:t>.REMOVE</a:t>
               </a:r>
               <a:endParaRPr lang="ko-KR" altLang="en-US" sz="800" dirty="0">
                 <a:solidFill>
@@ -22296,7 +22296,7 @@
                   <a:schemeClr val="bg1"/>
                 </a:solidFill>
               </a:rPr>
-              <a:t>$MOVE</a:t>
+              <a:t>.MOVE</a:t>
             </a:r>
             <a:endParaRPr lang="ko-KR" altLang="en-US" sz="800" dirty="0">
               <a:solidFill>
@@ -22691,7 +22691,7 @@
                   <a:schemeClr val="bg1"/>
                 </a:solidFill>
               </a:rPr>
-              <a:t>$REMOVE</a:t>
+              <a:t>.REMOVE</a:t>
             </a:r>
             <a:endParaRPr lang="ko-KR" altLang="en-US" sz="800" dirty="0">
               <a:solidFill>
@@ -22894,12 +22894,12 @@
           <a:p>
             <a:pPr algn="ctr"/>
             <a:r>
-              <a:rPr lang="en-US" altLang="ko-KR" sz="800" dirty="0">
+              <a:rPr lang="en-US" altLang="ko-KR" sz="800">
                 <a:solidFill>
                   <a:schemeClr val="bg1"/>
                 </a:solidFill>
               </a:rPr>
-              <a:t>$REMOVE</a:t>
+              <a:t>.REMOVE</a:t>
             </a:r>
             <a:endParaRPr lang="ko-KR" altLang="en-US" sz="800" dirty="0">
               <a:solidFill>
@@ -23129,7 +23129,7 @@
                       <a:schemeClr val="bg1"/>
                     </a:solidFill>
                   </a:rPr>
-                  <a:t>$MOVE</a:t>
+                  <a:t>.MOVE</a:t>
                 </a:r>
                 <a:endParaRPr lang="ko-KR" altLang="en-US" sz="800" dirty="0">
                   <a:solidFill>
@@ -23183,12 +23183,12 @@
               <a:p>
                 <a:pPr algn="ctr"/>
                 <a:r>
-                  <a:rPr lang="en-US" altLang="ko-KR" sz="800" dirty="0">
+                  <a:rPr lang="en-US" altLang="ko-KR" sz="800" dirty="0" err="1">
                     <a:solidFill>
                       <a:schemeClr val="bg1"/>
                     </a:solidFill>
                   </a:rPr>
-                  <a:t>Out$RET</a:t>
+                  <a:t>Out.RET</a:t>
                 </a:r>
                 <a:endParaRPr lang="ko-KR" altLang="en-US" sz="800" dirty="0">
                   <a:solidFill>
@@ -23242,12 +23242,12 @@
               <a:p>
                 <a:pPr algn="ctr"/>
                 <a:r>
-                  <a:rPr lang="en-US" altLang="ko-KR" sz="800" dirty="0">
+                  <a:rPr lang="en-US" altLang="ko-KR" sz="800" dirty="0" err="1">
                     <a:solidFill>
                       <a:schemeClr val="bg1"/>
                     </a:solidFill>
                   </a:rPr>
-                  <a:t>Out$ADV</a:t>
+                  <a:t>Out.ADV</a:t>
                 </a:r>
                 <a:endParaRPr lang="ko-KR" altLang="en-US" sz="800" dirty="0">
                   <a:solidFill>
@@ -23425,7 +23425,7 @@
                     <a:schemeClr val="bg1"/>
                   </a:solidFill>
                 </a:rPr>
-                <a:t>$REMOVE</a:t>
+                <a:t>.REMOVE</a:t>
               </a:r>
               <a:endParaRPr lang="ko-KR" altLang="en-US" sz="800" dirty="0">
                 <a:solidFill>

</xml_diff>